<commit_message>
New canonbot and byopizza dir
</commit_message>
<xml_diff>
--- a/Predictika Training.pptx
+++ b/Predictika Training.pptx
@@ -5,7 +5,7 @@
     <p:sldMasterId id="2147483648" r:id="rId1"/>
   </p:sldMasterIdLst>
   <p:notesMasterIdLst>
-    <p:notesMasterId r:id="rId22"/>
+    <p:notesMasterId r:id="rId23"/>
   </p:notesMasterIdLst>
   <p:sldIdLst>
     <p:sldId id="1431" r:id="rId2"/>
@@ -20,14 +20,15 @@
     <p:sldId id="2486" r:id="rId11"/>
     <p:sldId id="2487" r:id="rId12"/>
     <p:sldId id="2490" r:id="rId13"/>
-    <p:sldId id="2484" r:id="rId14"/>
-    <p:sldId id="2489" r:id="rId15"/>
-    <p:sldId id="2492" r:id="rId16"/>
-    <p:sldId id="2494" r:id="rId17"/>
-    <p:sldId id="2495" r:id="rId18"/>
-    <p:sldId id="2496" r:id="rId19"/>
-    <p:sldId id="2498" r:id="rId20"/>
-    <p:sldId id="2500" r:id="rId21"/>
+    <p:sldId id="2501" r:id="rId14"/>
+    <p:sldId id="2484" r:id="rId15"/>
+    <p:sldId id="2489" r:id="rId16"/>
+    <p:sldId id="2500" r:id="rId17"/>
+    <p:sldId id="2494" r:id="rId18"/>
+    <p:sldId id="2495" r:id="rId19"/>
+    <p:sldId id="2496" r:id="rId20"/>
+    <p:sldId id="2492" r:id="rId21"/>
+    <p:sldId id="2498" r:id="rId22"/>
   </p:sldIdLst>
   <p:sldSz cx="12192000" cy="6858000"/>
   <p:notesSz cx="6858000" cy="9144000"/>
@@ -8012,7 +8013,7 @@
           <a:p>
             <a:r>
               <a:rPr lang="en-US" dirty="0" smtClean="0"/>
-              <a:t>Models are like Objects</a:t>
+              <a:t>Resources and Docs to Read</a:t>
             </a:r>
             <a:endParaRPr lang="en-US" dirty="0"/>
           </a:p>
@@ -8025,107 +8026,166 @@
             <a:spLocks noGrp="1"/>
           </p:cNvSpPr>
           <p:nvPr>
-            <p:ph sz="half" idx="1"/>
+            <p:ph idx="1"/>
           </p:nvPr>
         </p:nvSpPr>
         <p:spPr/>
         <p:txBody>
           <a:bodyPr>
-            <a:normAutofit fontScale="85000" lnSpcReduction="10000"/>
+            <a:normAutofit fontScale="77500" lnSpcReduction="20000"/>
           </a:bodyPr>
           <a:lstStyle/>
           <a:p>
             <a:r>
-              <a:rPr lang="en-US" dirty="0" smtClean="0"/>
-              <a:t>Inheritance hierarchy among models</a:t>
-            </a:r>
-          </a:p>
-          <a:p>
-            <a:r>
-              <a:rPr lang="en-US" dirty="0" smtClean="0"/>
-              <a:t>Parameters hold data and determine dialog order.</a:t>
-            </a:r>
-          </a:p>
-          <a:p>
-            <a:r>
-              <a:rPr lang="en-US" dirty="0" smtClean="0"/>
-              <a:t>Set by user, via constraints, from external data source, or preset</a:t>
-            </a:r>
-          </a:p>
-          <a:p>
-            <a:r>
-              <a:rPr lang="en-US" dirty="0" err="1" smtClean="0"/>
-              <a:t>Datatypes</a:t>
-            </a:r>
-            <a:r>
-              <a:rPr lang="en-US" dirty="0" smtClean="0"/>
-              <a:t>: symbolic, numeric, </a:t>
-            </a:r>
-            <a:r>
-              <a:rPr lang="en-US" dirty="0" err="1" smtClean="0"/>
-              <a:t>arbit</a:t>
+              <a:rPr lang="en-US" b="1" dirty="0" smtClean="0"/>
+              <a:t>Tutorial for developing active agents using </a:t>
+            </a:r>
+            <a:r>
+              <a:rPr lang="en-US" b="1" dirty="0" err="1" smtClean="0"/>
+              <a:t>ByoPizza</a:t>
+            </a:r>
+            <a:r>
+              <a:rPr lang="en-US" b="1" dirty="0" smtClean="0"/>
+              <a:t> as example</a:t>
+            </a:r>
+            <a:r>
+              <a:rPr lang="en-US" dirty="0"/>
+              <a:t>: https://</a:t>
+            </a:r>
+            <a:r>
+              <a:rPr lang="en-US" dirty="0" err="1"/>
+              <a:t>docs.google.com</a:t>
+            </a:r>
+            <a:r>
+              <a:rPr lang="en-US" dirty="0"/>
+              <a:t>/document/d/1WjtdTxQ1lkEmowU-fLrn2sj5J92l6vu-KeG2ylXjzbM/</a:t>
+            </a:r>
+            <a:r>
+              <a:rPr lang="en-US" dirty="0" err="1"/>
+              <a:t>edit?usp</a:t>
+            </a:r>
+            <a:r>
+              <a:rPr lang="en-US" dirty="0"/>
+              <a:t>=sharing</a:t>
             </a:r>
             <a:endParaRPr lang="en-US" dirty="0" smtClean="0"/>
           </a:p>
           <a:p>
             <a:r>
-              <a:rPr lang="en-US" dirty="0" smtClean="0"/>
-              <a:t>Logic or modifiable</a:t>
-            </a:r>
-          </a:p>
-          <a:p>
-            <a:r>
-              <a:rPr lang="en-US" dirty="0" smtClean="0"/>
-              <a:t>Required or optional</a:t>
-            </a:r>
-          </a:p>
-          <a:p>
-            <a:r>
-              <a:rPr lang="en-US" dirty="0" smtClean="0"/>
-              <a:t>Extensive dialog annotations available</a:t>
-            </a:r>
-            <a:endParaRPr lang="en-US" dirty="0"/>
-          </a:p>
-        </p:txBody>
-      </p:sp>
-      <p:sp>
-        <p:nvSpPr>
-          <p:cNvPr id="4" name="Content Placeholder 3"/>
-          <p:cNvSpPr>
-            <a:spLocks noGrp="1"/>
-          </p:cNvSpPr>
-          <p:nvPr>
-            <p:ph sz="half" idx="2"/>
-          </p:nvPr>
-        </p:nvSpPr>
-        <p:spPr/>
-        <p:txBody>
-          <a:bodyPr>
-            <a:normAutofit fontScale="85000" lnSpcReduction="10000"/>
-          </a:bodyPr>
-          <a:lstStyle/>
-          <a:p>
-            <a:r>
-              <a:rPr lang="en-US" dirty="0" smtClean="0"/>
-              <a:t>Constraints compute values, signal failure, change order of dialog, check status</a:t>
-            </a:r>
-          </a:p>
-          <a:p>
-            <a:r>
-              <a:rPr lang="en-US" dirty="0" smtClean="0"/>
-              <a:t>Table</a:t>
-            </a:r>
-          </a:p>
-          <a:p>
-            <a:r>
-              <a:rPr lang="en-US" dirty="0" smtClean="0"/>
-              <a:t>Rule-like constraints that can be very different from traditional rules</a:t>
-            </a:r>
-          </a:p>
-          <a:p>
-            <a:r>
-              <a:rPr lang="en-US" dirty="0" smtClean="0"/>
-              <a:t>Two types of rule constraints: conditions (just test) and assert (propagate to try to succeed)</a:t>
+              <a:rPr lang="en-US" b="1" dirty="0" smtClean="0"/>
+              <a:t>YAML format for </a:t>
+            </a:r>
+            <a:r>
+              <a:rPr lang="en-US" b="1" dirty="0"/>
+              <a:t>knowledge bases</a:t>
+            </a:r>
+            <a:r>
+              <a:rPr lang="en-US" dirty="0"/>
+              <a:t>: </a:t>
+            </a:r>
+            <a:r>
+              <a:rPr lang="en-US" dirty="0">
+                <a:hlinkClick r:id="rId2"/>
+              </a:rPr>
+              <a:t>https://docs.google.com/document/d/1VnRSsIec_TJLPBy_gNW1vwVh11z--gcQuAxbCmoNScI/edit?usp=</a:t>
+            </a:r>
+            <a:r>
+              <a:rPr lang="en-US" dirty="0" smtClean="0">
+                <a:hlinkClick r:id="rId2"/>
+              </a:rPr>
+              <a:t>sharing</a:t>
+            </a:r>
+            <a:endParaRPr lang="en-US" dirty="0" smtClean="0"/>
+          </a:p>
+          <a:p>
+            <a:r>
+              <a:rPr lang="en-US" b="1" dirty="0" smtClean="0"/>
+              <a:t>Styles </a:t>
+            </a:r>
+            <a:r>
+              <a:rPr lang="en-US" b="1" dirty="0"/>
+              <a:t>of dialog</a:t>
+            </a:r>
+            <a:r>
+              <a:rPr lang="en-US" dirty="0"/>
+              <a:t>. https://</a:t>
+            </a:r>
+            <a:r>
+              <a:rPr lang="en-US" dirty="0" err="1"/>
+              <a:t>docs.google.com</a:t>
+            </a:r>
+            <a:r>
+              <a:rPr lang="en-US" dirty="0"/>
+              <a:t>/document/d/15vbKO3EDocwixI7-lssyBIM_D3hhLaSiSETMu-VzUYk/</a:t>
+            </a:r>
+            <a:r>
+              <a:rPr lang="en-US" dirty="0" err="1"/>
+              <a:t>edit?usp</a:t>
+            </a:r>
+            <a:r>
+              <a:rPr lang="en-US" dirty="0"/>
+              <a:t>=sharing</a:t>
+            </a:r>
+          </a:p>
+          <a:p>
+            <a:r>
+              <a:rPr lang="en-US" b="1" dirty="0" smtClean="0"/>
+              <a:t>KB Annotations for Dialog management (NLP, UI, </a:t>
+            </a:r>
+            <a:r>
+              <a:rPr lang="en-US" b="1" dirty="0" err="1" smtClean="0"/>
+              <a:t>AskUser</a:t>
+            </a:r>
+            <a:r>
+              <a:rPr lang="en-US" b="1" dirty="0" smtClean="0"/>
+              <a:t>)</a:t>
+            </a:r>
+            <a:r>
+              <a:rPr lang="en-US" dirty="0"/>
+              <a:t>: https://</a:t>
+            </a:r>
+            <a:r>
+              <a:rPr lang="en-US" dirty="0" err="1"/>
+              <a:t>docs.google.com</a:t>
+            </a:r>
+            <a:r>
+              <a:rPr lang="en-US" dirty="0"/>
+              <a:t>/document/d/1DbQ3SlWquX5-dlNqxhACjZAciS51YM2rcAOWF7g1UHo/</a:t>
+            </a:r>
+            <a:r>
+              <a:rPr lang="en-US" dirty="0" err="1"/>
+              <a:t>edit?usp</a:t>
+            </a:r>
+            <a:r>
+              <a:rPr lang="en-US" dirty="0"/>
+              <a:t>=sharing</a:t>
+            </a:r>
+            <a:endParaRPr lang="en-US" dirty="0" smtClean="0"/>
+          </a:p>
+          <a:p>
+            <a:r>
+              <a:rPr lang="en-US" b="1" dirty="0" smtClean="0"/>
+              <a:t>Dialog Logic Constraint Language manual</a:t>
+            </a:r>
+            <a:r>
+              <a:rPr lang="en-US" dirty="0"/>
+              <a:t>: https://</a:t>
+            </a:r>
+            <a:r>
+              <a:rPr lang="en-US" dirty="0" err="1"/>
+              <a:t>docs.google.com</a:t>
+            </a:r>
+            <a:r>
+              <a:rPr lang="en-US" dirty="0"/>
+              <a:t>/document/d/1iRJX4hmA9dqArmZEgiKEKzLFyAuY-1hQ0mylzSFMxYk/</a:t>
+            </a:r>
+            <a:r>
+              <a:rPr lang="en-US" dirty="0" err="1"/>
+              <a:t>edit?usp</a:t>
+            </a:r>
+            <a:r>
+              <a:rPr lang="en-US" dirty="0"/>
+              <a:t>=sharing</a:t>
             </a:r>
           </a:p>
         </p:txBody>
@@ -8133,7 +8193,7 @@
     </p:spTree>
     <p:extLst>
       <p:ext uri="{BB962C8B-B14F-4D97-AF65-F5344CB8AC3E}">
-        <p14:creationId xmlns:p14="http://schemas.microsoft.com/office/powerpoint/2010/main" val="3166783864"/>
+        <p14:creationId xmlns:p14="http://schemas.microsoft.com/office/powerpoint/2010/main" val="3587402132"/>
       </p:ext>
     </p:extLst>
   </p:cSld>
@@ -8180,7 +8240,7 @@
           <a:p>
             <a:r>
               <a:rPr lang="en-US" dirty="0" smtClean="0"/>
-              <a:t>Dialog Order: What to ask next?</a:t>
+              <a:t>Models are like Objects</a:t>
             </a:r>
             <a:endParaRPr lang="en-US" dirty="0"/>
           </a:p>
@@ -8198,50 +8258,59 @@
         </p:nvSpPr>
         <p:spPr/>
         <p:txBody>
-          <a:bodyPr/>
+          <a:bodyPr>
+            <a:normAutofit fontScale="85000" lnSpcReduction="10000"/>
+          </a:bodyPr>
           <a:lstStyle/>
           <a:p>
             <a:r>
               <a:rPr lang="en-US" dirty="0" smtClean="0"/>
-              <a:t>Start with top model</a:t>
+              <a:t>Inheritance hierarchy among models</a:t>
             </a:r>
           </a:p>
           <a:p>
             <a:r>
               <a:rPr lang="en-US" dirty="0" smtClean="0"/>
-              <a:t>Follow its Required </a:t>
-            </a:r>
+              <a:t>Parameters hold data and determine dialog order.</a:t>
+            </a:r>
+          </a:p>
+          <a:p>
+            <a:r>
+              <a:rPr lang="en-US" dirty="0" smtClean="0"/>
+              <a:t>Set by user, via constraints, from external data source, or preset</a:t>
+            </a:r>
+          </a:p>
+          <a:p>
             <a:r>
               <a:rPr lang="en-US" dirty="0" err="1" smtClean="0"/>
-              <a:t>para</a:t>
+              <a:t>Datatypes</a:t>
             </a:r>
             <a:r>
               <a:rPr lang="en-US" dirty="0" smtClean="0"/>
-              <a:t> in order</a:t>
-            </a:r>
+              <a:t>: symbolic, numeric, </a:t>
+            </a:r>
+            <a:r>
+              <a:rPr lang="en-US" dirty="0" err="1" smtClean="0"/>
+              <a:t>arbit</a:t>
+            </a:r>
+            <a:endParaRPr lang="en-US" dirty="0" smtClean="0"/>
           </a:p>
           <a:p>
             <a:r>
               <a:rPr lang="en-US" dirty="0" smtClean="0"/>
-              <a:t>Skip the assigned one, unless it has a model as value. If so </a:t>
-            </a:r>
-            <a:r>
-              <a:rPr lang="en-US" dirty="0" err="1" smtClean="0"/>
-              <a:t>recurse</a:t>
-            </a:r>
+              <a:t>Logic or modifiable</a:t>
+            </a:r>
+          </a:p>
+          <a:p>
             <a:r>
               <a:rPr lang="en-US" dirty="0" smtClean="0"/>
-              <a:t> into that model</a:t>
+              <a:t>Required or optional</a:t>
             </a:r>
           </a:p>
           <a:p>
             <a:r>
               <a:rPr lang="en-US" dirty="0" smtClean="0"/>
-              <a:t>Dialog ends when the top model has NO more unassigned Required </a:t>
-            </a:r>
-            <a:r>
-              <a:rPr lang="en-US" dirty="0" err="1" smtClean="0"/>
-              <a:t>para</a:t>
+              <a:t>Extensive dialog annotations available</a:t>
             </a:r>
             <a:endParaRPr lang="en-US" dirty="0"/>
           </a:p>
@@ -8259,65 +8328,40 @@
         </p:nvSpPr>
         <p:spPr/>
         <p:txBody>
-          <a:bodyPr/>
+          <a:bodyPr>
+            <a:normAutofit fontScale="85000" lnSpcReduction="10000"/>
+          </a:bodyPr>
           <a:lstStyle/>
           <a:p>
             <a:r>
               <a:rPr lang="en-US" dirty="0" smtClean="0"/>
-              <a:t>An optional </a:t>
-            </a:r>
-            <a:r>
-              <a:rPr lang="en-US" dirty="0" err="1" smtClean="0"/>
-              <a:t>para</a:t>
-            </a:r>
+              <a:t>Constraints compute values, signal failure, change order of dialog, check status</a:t>
+            </a:r>
+          </a:p>
+          <a:p>
             <a:r>
               <a:rPr lang="en-US" dirty="0" smtClean="0"/>
-              <a:t> can be made Required via a constraint</a:t>
+              <a:t>Table</a:t>
             </a:r>
           </a:p>
           <a:p>
             <a:r>
               <a:rPr lang="en-US" dirty="0" smtClean="0"/>
-              <a:t>A Required </a:t>
-            </a:r>
-            <a:r>
-              <a:rPr lang="en-US" dirty="0" err="1" smtClean="0"/>
-              <a:t>para</a:t>
-            </a:r>
+              <a:t>Rule-like constraints that can be very different from traditional rules</a:t>
+            </a:r>
+          </a:p>
+          <a:p>
             <a:r>
               <a:rPr lang="en-US" dirty="0" smtClean="0"/>
-              <a:t> can be made Ignored via a constraint and will be so ignored for Dialog Order.</a:t>
-            </a:r>
-          </a:p>
-          <a:p>
-            <a:r>
-              <a:rPr lang="en-US" dirty="0" smtClean="0"/>
-              <a:t>Explicitly make a </a:t>
-            </a:r>
-            <a:r>
-              <a:rPr lang="en-US" dirty="0" err="1" smtClean="0"/>
-              <a:t>para</a:t>
-            </a:r>
-            <a:r>
-              <a:rPr lang="en-US" dirty="0" smtClean="0"/>
-              <a:t> as the Next Para via constraint OR Iterative </a:t>
-            </a:r>
-            <a:r>
-              <a:rPr lang="en-US" dirty="0" err="1" smtClean="0"/>
-              <a:t>para</a:t>
-            </a:r>
-            <a:r>
-              <a:rPr lang="en-US" dirty="0" smtClean="0"/>
-              <a:t>.</a:t>
-            </a:r>
-            <a:endParaRPr lang="en-US" dirty="0"/>
+              <a:t>Two types of rule constraints: conditions (just test) and assert (propagate to try to succeed)</a:t>
+            </a:r>
           </a:p>
         </p:txBody>
       </p:sp>
     </p:spTree>
     <p:extLst>
       <p:ext uri="{BB962C8B-B14F-4D97-AF65-F5344CB8AC3E}">
-        <p14:creationId xmlns:p14="http://schemas.microsoft.com/office/powerpoint/2010/main" val="3465293155"/>
+        <p14:creationId xmlns:p14="http://schemas.microsoft.com/office/powerpoint/2010/main" val="3166783864"/>
       </p:ext>
     </p:extLst>
   </p:cSld>
@@ -8354,38 +8398,145 @@
             <a:spLocks noGrp="1"/>
           </p:cNvSpPr>
           <p:nvPr>
-            <p:ph type="ctrTitle"/>
+            <p:ph type="title"/>
           </p:nvPr>
         </p:nvSpPr>
-        <p:spPr>
-          <a:xfrm>
-            <a:off x="1524000" y="1122362"/>
-            <a:ext cx="9144000" cy="4124159"/>
-          </a:xfrm>
-        </p:spPr>
+        <p:spPr/>
         <p:txBody>
-          <a:bodyPr>
-            <a:normAutofit/>
-          </a:bodyPr>
+          <a:bodyPr/>
           <a:lstStyle/>
           <a:p>
             <a:r>
               <a:rPr lang="en-US" dirty="0" smtClean="0"/>
-              <a:t>Sample Bot</a:t>
-            </a:r>
-            <a:br>
+              <a:t>Dialog Order: What to ask next?</a:t>
+            </a:r>
+            <a:endParaRPr lang="en-US" dirty="0"/>
+          </a:p>
+        </p:txBody>
+      </p:sp>
+      <p:sp>
+        <p:nvSpPr>
+          <p:cNvPr id="3" name="Content Placeholder 2"/>
+          <p:cNvSpPr>
+            <a:spLocks noGrp="1"/>
+          </p:cNvSpPr>
+          <p:nvPr>
+            <p:ph sz="half" idx="1"/>
+          </p:nvPr>
+        </p:nvSpPr>
+        <p:spPr/>
+        <p:txBody>
+          <a:bodyPr/>
+          <a:lstStyle/>
+          <a:p>
+            <a:r>
               <a:rPr lang="en-US" dirty="0" smtClean="0"/>
-            </a:br>
+              <a:t>Start with top model</a:t>
+            </a:r>
+          </a:p>
+          <a:p>
             <a:r>
               <a:rPr lang="en-US" dirty="0" smtClean="0"/>
-              <a:t>BMW Bot</a:t>
-            </a:r>
-            <a:br>
+              <a:t>Follow its Required </a:t>
+            </a:r>
+            <a:r>
+              <a:rPr lang="en-US" dirty="0" err="1" smtClean="0"/>
+              <a:t>para</a:t>
+            </a:r>
+            <a:r>
               <a:rPr lang="en-US" dirty="0" smtClean="0"/>
-            </a:br>
+              <a:t> in order</a:t>
+            </a:r>
+          </a:p>
+          <a:p>
             <a:r>
               <a:rPr lang="en-US" dirty="0" smtClean="0"/>
-              <a:t>Example of a Selection Problem</a:t>
+              <a:t>Skip the assigned one, unless it has a model as value. If so </a:t>
+            </a:r>
+            <a:r>
+              <a:rPr lang="en-US" dirty="0" err="1" smtClean="0"/>
+              <a:t>recurse</a:t>
+            </a:r>
+            <a:r>
+              <a:rPr lang="en-US" dirty="0" smtClean="0"/>
+              <a:t> into that model</a:t>
+            </a:r>
+          </a:p>
+          <a:p>
+            <a:r>
+              <a:rPr lang="en-US" dirty="0" smtClean="0"/>
+              <a:t>Dialog ends when the top model has NO more unassigned Required </a:t>
+            </a:r>
+            <a:r>
+              <a:rPr lang="en-US" dirty="0" err="1" smtClean="0"/>
+              <a:t>para</a:t>
+            </a:r>
+            <a:endParaRPr lang="en-US" dirty="0"/>
+          </a:p>
+        </p:txBody>
+      </p:sp>
+      <p:sp>
+        <p:nvSpPr>
+          <p:cNvPr id="4" name="Content Placeholder 3"/>
+          <p:cNvSpPr>
+            <a:spLocks noGrp="1"/>
+          </p:cNvSpPr>
+          <p:nvPr>
+            <p:ph sz="half" idx="2"/>
+          </p:nvPr>
+        </p:nvSpPr>
+        <p:spPr/>
+        <p:txBody>
+          <a:bodyPr/>
+          <a:lstStyle/>
+          <a:p>
+            <a:r>
+              <a:rPr lang="en-US" dirty="0" smtClean="0"/>
+              <a:t>An optional </a:t>
+            </a:r>
+            <a:r>
+              <a:rPr lang="en-US" dirty="0" err="1" smtClean="0"/>
+              <a:t>para</a:t>
+            </a:r>
+            <a:r>
+              <a:rPr lang="en-US" dirty="0" smtClean="0"/>
+              <a:t> can be made Required via a constraint</a:t>
+            </a:r>
+          </a:p>
+          <a:p>
+            <a:r>
+              <a:rPr lang="en-US" dirty="0" smtClean="0"/>
+              <a:t>A Required </a:t>
+            </a:r>
+            <a:r>
+              <a:rPr lang="en-US" dirty="0" err="1" smtClean="0"/>
+              <a:t>para</a:t>
+            </a:r>
+            <a:r>
+              <a:rPr lang="en-US" dirty="0" smtClean="0"/>
+              <a:t> can be made Ignored via a constraint and will be so ignored for Dialog Order.</a:t>
+            </a:r>
+          </a:p>
+          <a:p>
+            <a:r>
+              <a:rPr lang="en-US" dirty="0" smtClean="0"/>
+              <a:t>Explicitly make a </a:t>
+            </a:r>
+            <a:r>
+              <a:rPr lang="en-US" dirty="0" err="1" smtClean="0"/>
+              <a:t>para</a:t>
+            </a:r>
+            <a:r>
+              <a:rPr lang="en-US" dirty="0" smtClean="0"/>
+              <a:t> as the Next Para via constraint OR Iterative </a:t>
+            </a:r>
+            <a:r>
+              <a:rPr lang="en-US" dirty="0" err="1" smtClean="0"/>
+              <a:t>para</a:t>
+            </a:r>
+            <a:r>
+              <a:rPr lang="en-US" dirty="0" smtClean="0"/>
+              <a:t>.</a:t>
             </a:r>
             <a:endParaRPr lang="en-US" dirty="0"/>
           </a:p>
@@ -8394,7 +8545,7 @@
     </p:spTree>
     <p:extLst>
       <p:ext uri="{BB962C8B-B14F-4D97-AF65-F5344CB8AC3E}">
-        <p14:creationId xmlns:p14="http://schemas.microsoft.com/office/powerpoint/2010/main" val="305398468"/>
+        <p14:creationId xmlns:p14="http://schemas.microsoft.com/office/powerpoint/2010/main" val="3465293155"/>
       </p:ext>
     </p:extLst>
   </p:cSld>
@@ -8431,67 +8582,40 @@
             <a:spLocks noGrp="1"/>
           </p:cNvSpPr>
           <p:nvPr>
-            <p:ph type="title"/>
+            <p:ph type="ctrTitle"/>
           </p:nvPr>
         </p:nvSpPr>
-        <p:spPr/>
+        <p:spPr>
+          <a:xfrm>
+            <a:off x="1459856" y="1321251"/>
+            <a:ext cx="9144000" cy="3907622"/>
+          </a:xfrm>
+        </p:spPr>
         <p:txBody>
           <a:bodyPr/>
           <a:lstStyle/>
           <a:p>
             <a:r>
               <a:rPr lang="en-US" dirty="0" smtClean="0"/>
-              <a:t>Dialog Annotations on Models</a:t>
-            </a:r>
-            <a:endParaRPr lang="en-US" dirty="0"/>
-          </a:p>
-        </p:txBody>
-      </p:sp>
-      <p:sp>
-        <p:nvSpPr>
-          <p:cNvPr id="3" name="Content Placeholder 2"/>
-          <p:cNvSpPr>
-            <a:spLocks noGrp="1"/>
-          </p:cNvSpPr>
-          <p:nvPr>
-            <p:ph sz="half" idx="1"/>
-          </p:nvPr>
-        </p:nvSpPr>
-        <p:spPr/>
-        <p:txBody>
-          <a:bodyPr/>
-          <a:lstStyle/>
-          <a:p>
+              <a:t>Sample Bot</a:t>
+            </a:r>
+            <a:br>
+              <a:rPr lang="en-US" dirty="0" smtClean="0"/>
+            </a:br>
             <a:r>
               <a:rPr lang="en-US" dirty="0" err="1" smtClean="0"/>
-              <a:t>AskUser</a:t>
+              <a:t>Predictibot</a:t>
             </a:r>
             <a:r>
               <a:rPr lang="en-US" dirty="0" smtClean="0"/>
-              <a:t> Annotations</a:t>
-            </a:r>
-            <a:endParaRPr lang="en-US" dirty="0"/>
-          </a:p>
-        </p:txBody>
-      </p:sp>
-      <p:sp>
-        <p:nvSpPr>
-          <p:cNvPr id="4" name="Content Placeholder 3"/>
-          <p:cNvSpPr>
-            <a:spLocks noGrp="1"/>
-          </p:cNvSpPr>
-          <p:nvPr>
-            <p:ph sz="half" idx="2"/>
-          </p:nvPr>
-        </p:nvSpPr>
-        <p:spPr/>
-        <p:txBody>
-          <a:bodyPr/>
-          <a:lstStyle/>
-          <a:p>
-            <a:r>
+              <a:t/>
+            </a:r>
+            <a:br>
               <a:rPr lang="en-US" dirty="0" smtClean="0"/>
-              <a:t>UI Annotations</a:t>
+            </a:br>
+            <a:r>
+              <a:rPr lang="en-US" dirty="0" smtClean="0"/>
+              <a:t>Example of Website Agent</a:t>
             </a:r>
             <a:endParaRPr lang="en-US" dirty="0"/>
           </a:p>
@@ -8500,7 +8624,7 @@
     </p:spTree>
     <p:extLst>
       <p:ext uri="{BB962C8B-B14F-4D97-AF65-F5344CB8AC3E}">
-        <p14:creationId xmlns:p14="http://schemas.microsoft.com/office/powerpoint/2010/main" val="3451781859"/>
+        <p14:creationId xmlns:p14="http://schemas.microsoft.com/office/powerpoint/2010/main" val="2298216452"/>
       </p:ext>
     </p:extLst>
   </p:cSld>
@@ -8547,7 +8671,7 @@
           <a:p>
             <a:r>
               <a:rPr lang="en-US" dirty="0" smtClean="0"/>
-              <a:t>More Annotations</a:t>
+              <a:t>Dialog Annotations on Models</a:t>
             </a:r>
             <a:endParaRPr lang="en-US" dirty="0"/>
           </a:p>
@@ -8569,8 +8693,12 @@
           <a:lstStyle/>
           <a:p>
             <a:r>
+              <a:rPr lang="en-US" dirty="0" err="1" smtClean="0"/>
+              <a:t>AskUser</a:t>
+            </a:r>
+            <a:r>
               <a:rPr lang="en-US" dirty="0" smtClean="0"/>
-              <a:t>NLP Annotations</a:t>
+              <a:t> Annotations</a:t>
             </a:r>
             <a:endParaRPr lang="en-US" dirty="0"/>
           </a:p>
@@ -8591,14 +8719,18 @@
           <a:bodyPr/>
           <a:lstStyle/>
           <a:p>
-            <a:endParaRPr lang="en-US"/>
+            <a:r>
+              <a:rPr lang="en-US" dirty="0" smtClean="0"/>
+              <a:t>UI Annotations</a:t>
+            </a:r>
+            <a:endParaRPr lang="en-US" dirty="0"/>
           </a:p>
         </p:txBody>
       </p:sp>
     </p:spTree>
     <p:extLst>
       <p:ext uri="{BB962C8B-B14F-4D97-AF65-F5344CB8AC3E}">
-        <p14:creationId xmlns:p14="http://schemas.microsoft.com/office/powerpoint/2010/main" val="1906198365"/>
+        <p14:creationId xmlns:p14="http://schemas.microsoft.com/office/powerpoint/2010/main" val="3451781859"/>
       </p:ext>
     </p:extLst>
   </p:cSld>
@@ -8645,7 +8777,7 @@
           <a:p>
             <a:r>
               <a:rPr lang="en-US" dirty="0" smtClean="0"/>
-              <a:t>Creating Models and Constraints from Externally loaded Data</a:t>
+              <a:t>More Annotations</a:t>
             </a:r>
             <a:endParaRPr lang="en-US" dirty="0"/>
           </a:p>
@@ -8668,47 +8800,7 @@
           <a:p>
             <a:r>
               <a:rPr lang="en-US" dirty="0" smtClean="0"/>
-              <a:t>Create base models in a KB</a:t>
-            </a:r>
-          </a:p>
-          <a:p>
-            <a:r>
-              <a:rPr lang="en-US" dirty="0" smtClean="0"/>
-              <a:t>Import KB into another</a:t>
-            </a:r>
-          </a:p>
-          <a:p>
-            <a:r>
-              <a:rPr lang="en-US" dirty="0" smtClean="0"/>
-              <a:t>Create models from CSV file  --&gt; One model per row</a:t>
-            </a:r>
-          </a:p>
-          <a:p>
-            <a:r>
-              <a:rPr lang="en-US" dirty="0" smtClean="0"/>
-              <a:t>Column </a:t>
-            </a:r>
-            <a:r>
-              <a:rPr lang="en-US" dirty="0" smtClean="0">
-                <a:sym typeface="Wingdings"/>
-              </a:rPr>
-              <a:t> Parameter</a:t>
-            </a:r>
-          </a:p>
-          <a:p>
-            <a:r>
-              <a:rPr lang="en-US" dirty="0" smtClean="0">
-                <a:sym typeface="Wingdings"/>
-              </a:rPr>
-              <a:t>Cell  Parameter value</a:t>
-            </a:r>
-          </a:p>
-          <a:p>
-            <a:r>
-              <a:rPr lang="en-US" dirty="0" smtClean="0">
-                <a:sym typeface="Wingdings"/>
-              </a:rPr>
-              <a:t>Predefined models can be used as a model class OR No base model</a:t>
+              <a:t>NLP Annotations</a:t>
             </a:r>
             <a:endParaRPr lang="en-US" dirty="0"/>
           </a:p>
@@ -8729,24 +8821,14 @@
           <a:bodyPr/>
           <a:lstStyle/>
           <a:p>
-            <a:r>
-              <a:rPr lang="en-US" dirty="0" smtClean="0"/>
-              <a:t>Domain of a parameter can be dynamically defined from file loaded/created models</a:t>
-            </a:r>
-          </a:p>
-          <a:p>
-            <a:r>
-              <a:rPr lang="en-US" dirty="0" smtClean="0"/>
-              <a:t>Table constraints can be created from external files too.</a:t>
-            </a:r>
-            <a:endParaRPr lang="en-US" dirty="0"/>
+            <a:endParaRPr lang="en-US"/>
           </a:p>
         </p:txBody>
       </p:sp>
     </p:spTree>
     <p:extLst>
       <p:ext uri="{BB962C8B-B14F-4D97-AF65-F5344CB8AC3E}">
-        <p14:creationId xmlns:p14="http://schemas.microsoft.com/office/powerpoint/2010/main" val="1199143371"/>
+        <p14:creationId xmlns:p14="http://schemas.microsoft.com/office/powerpoint/2010/main" val="1906198365"/>
       </p:ext>
     </p:extLst>
   </p:cSld>
@@ -8783,49 +8865,109 @@
             <a:spLocks noGrp="1"/>
           </p:cNvSpPr>
           <p:nvPr>
-            <p:ph type="ctrTitle"/>
+            <p:ph type="title"/>
           </p:nvPr>
         </p:nvSpPr>
-        <p:spPr>
-          <a:xfrm>
-            <a:off x="1434199" y="1654771"/>
-            <a:ext cx="9144000" cy="3907621"/>
-          </a:xfrm>
-        </p:spPr>
+        <p:spPr/>
         <p:txBody>
-          <a:bodyPr>
-            <a:normAutofit fontScale="90000"/>
-          </a:bodyPr>
+          <a:bodyPr/>
           <a:lstStyle/>
           <a:p>
             <a:r>
               <a:rPr lang="en-US" dirty="0" smtClean="0"/>
-              <a:t>Sample Bot</a:t>
-            </a:r>
-            <a:br>
+              <a:t>Creating Models and Constraints from Externally loaded Data</a:t>
+            </a:r>
+            <a:endParaRPr lang="en-US" dirty="0"/>
+          </a:p>
+        </p:txBody>
+      </p:sp>
+      <p:sp>
+        <p:nvSpPr>
+          <p:cNvPr id="3" name="Content Placeholder 2"/>
+          <p:cNvSpPr>
+            <a:spLocks noGrp="1"/>
+          </p:cNvSpPr>
+          <p:nvPr>
+            <p:ph sz="half" idx="1"/>
+          </p:nvPr>
+        </p:nvSpPr>
+        <p:spPr/>
+        <p:txBody>
+          <a:bodyPr/>
+          <a:lstStyle/>
+          <a:p>
+            <a:r>
               <a:rPr lang="en-US" dirty="0" smtClean="0"/>
-            </a:br>
-            <a:r>
-              <a:rPr lang="en-US" dirty="0" err="1" smtClean="0"/>
-              <a:t>Hotelbot</a:t>
-            </a:r>
+              <a:t>Create base models in a KB</a:t>
+            </a:r>
+          </a:p>
+          <a:p>
             <a:r>
               <a:rPr lang="en-US" dirty="0" smtClean="0"/>
-              <a:t/>
-            </a:r>
-            <a:br>
+              <a:t>Import KB into another</a:t>
+            </a:r>
+          </a:p>
+          <a:p>
+            <a:r>
               <a:rPr lang="en-US" dirty="0" smtClean="0"/>
-            </a:br>
+              <a:t>Create models from CSV file  --&gt; One model per row</a:t>
+            </a:r>
+          </a:p>
+          <a:p>
             <a:r>
               <a:rPr lang="en-US" dirty="0" smtClean="0"/>
-              <a:t>Example of Creating Models from data file</a:t>
-            </a:r>
-            <a:br>
+              <a:t>Column </a:t>
+            </a:r>
+            <a:r>
+              <a:rPr lang="en-US" dirty="0" smtClean="0">
+                <a:sym typeface="Wingdings"/>
+              </a:rPr>
+              <a:t> Parameter</a:t>
+            </a:r>
+          </a:p>
+          <a:p>
+            <a:r>
+              <a:rPr lang="en-US" dirty="0" smtClean="0">
+                <a:sym typeface="Wingdings"/>
+              </a:rPr>
+              <a:t>Cell  Parameter value</a:t>
+            </a:r>
+          </a:p>
+          <a:p>
+            <a:r>
+              <a:rPr lang="en-US" dirty="0" smtClean="0">
+                <a:sym typeface="Wingdings"/>
+              </a:rPr>
+              <a:t>Predefined models can be used as a model class OR No base model</a:t>
+            </a:r>
+            <a:endParaRPr lang="en-US" dirty="0"/>
+          </a:p>
+        </p:txBody>
+      </p:sp>
+      <p:sp>
+        <p:nvSpPr>
+          <p:cNvPr id="4" name="Content Placeholder 3"/>
+          <p:cNvSpPr>
+            <a:spLocks noGrp="1"/>
+          </p:cNvSpPr>
+          <p:nvPr>
+            <p:ph sz="half" idx="2"/>
+          </p:nvPr>
+        </p:nvSpPr>
+        <p:spPr/>
+        <p:txBody>
+          <a:bodyPr/>
+          <a:lstStyle/>
+          <a:p>
+            <a:r>
               <a:rPr lang="en-US" dirty="0" smtClean="0"/>
-            </a:br>
+              <a:t>Domain of a parameter can be dynamically defined from file loaded/created models</a:t>
+            </a:r>
+          </a:p>
+          <a:p>
             <a:r>
               <a:rPr lang="en-US" dirty="0" smtClean="0"/>
-              <a:t>and Customer Support</a:t>
+              <a:t>Table constraints can be created from external files too.</a:t>
             </a:r>
             <a:endParaRPr lang="en-US" dirty="0"/>
           </a:p>
@@ -8834,7 +8976,7 @@
     </p:spTree>
     <p:extLst>
       <p:ext uri="{BB962C8B-B14F-4D97-AF65-F5344CB8AC3E}">
-        <p14:creationId xmlns:p14="http://schemas.microsoft.com/office/powerpoint/2010/main" val="4291100550"/>
+        <p14:creationId xmlns:p14="http://schemas.microsoft.com/office/powerpoint/2010/main" val="1199143371"/>
       </p:ext>
     </p:extLst>
   </p:cSld>
@@ -9711,12 +9853,14 @@
         </p:nvSpPr>
         <p:spPr>
           <a:xfrm>
-            <a:off x="1459856" y="1321251"/>
-            <a:ext cx="9144000" cy="3907622"/>
+            <a:off x="1524000" y="1122362"/>
+            <a:ext cx="9144000" cy="4124159"/>
           </a:xfrm>
         </p:spPr>
         <p:txBody>
-          <a:bodyPr/>
+          <a:bodyPr>
+            <a:normAutofit/>
+          </a:bodyPr>
           <a:lstStyle/>
           <a:p>
             <a:r>
@@ -9727,19 +9871,15 @@
               <a:rPr lang="en-US" dirty="0" smtClean="0"/>
             </a:br>
             <a:r>
-              <a:rPr lang="en-US" dirty="0" err="1" smtClean="0"/>
-              <a:t>Predictibot</a:t>
-            </a:r>
-            <a:r>
               <a:rPr lang="en-US" dirty="0" smtClean="0"/>
-              <a:t/>
+              <a:t>BMW Bot</a:t>
             </a:r>
             <a:br>
               <a:rPr lang="en-US" dirty="0" smtClean="0"/>
             </a:br>
             <a:r>
               <a:rPr lang="en-US" dirty="0" smtClean="0"/>
-              <a:t>Example of Website Agent</a:t>
+              <a:t>Example of a Selection Problem</a:t>
             </a:r>
             <a:endParaRPr lang="en-US" dirty="0"/>
           </a:p>
@@ -9748,7 +9888,95 @@
     </p:spTree>
     <p:extLst>
       <p:ext uri="{BB962C8B-B14F-4D97-AF65-F5344CB8AC3E}">
-        <p14:creationId xmlns:p14="http://schemas.microsoft.com/office/powerpoint/2010/main" val="2298216452"/>
+        <p14:creationId xmlns:p14="http://schemas.microsoft.com/office/powerpoint/2010/main" val="305398468"/>
+      </p:ext>
+    </p:extLst>
+  </p:cSld>
+  <p:clrMapOvr>
+    <a:masterClrMapping/>
+  </p:clrMapOvr>
+  <p:transition xmlns:p14="http://schemas.microsoft.com/office/powerpoint/2010/main" spd="slow">
+    <p:push dir="u"/>
+  </p:transition>
+</p:sld>
+</file>
+
+<file path=ppt/slides/slide21.xml><?xml version="1.0" encoding="utf-8"?>
+<p:sld xmlns:a="http://schemas.openxmlformats.org/drawingml/2006/main" xmlns:r="http://schemas.openxmlformats.org/officeDocument/2006/relationships" xmlns:p="http://schemas.openxmlformats.org/presentationml/2006/main">
+  <p:cSld>
+    <p:spTree>
+      <p:nvGrpSpPr>
+        <p:cNvPr id="1" name=""/>
+        <p:cNvGrpSpPr/>
+        <p:nvPr/>
+      </p:nvGrpSpPr>
+      <p:grpSpPr>
+        <a:xfrm>
+          <a:off x="0" y="0"/>
+          <a:ext cx="0" cy="0"/>
+          <a:chOff x="0" y="0"/>
+          <a:chExt cx="0" cy="0"/>
+        </a:xfrm>
+      </p:grpSpPr>
+      <p:sp>
+        <p:nvSpPr>
+          <p:cNvPr id="2" name="Title 1"/>
+          <p:cNvSpPr>
+            <a:spLocks noGrp="1"/>
+          </p:cNvSpPr>
+          <p:nvPr>
+            <p:ph type="ctrTitle"/>
+          </p:nvPr>
+        </p:nvSpPr>
+        <p:spPr>
+          <a:xfrm>
+            <a:off x="1434199" y="1654771"/>
+            <a:ext cx="9144000" cy="3907621"/>
+          </a:xfrm>
+        </p:spPr>
+        <p:txBody>
+          <a:bodyPr>
+            <a:normAutofit fontScale="90000"/>
+          </a:bodyPr>
+          <a:lstStyle/>
+          <a:p>
+            <a:r>
+              <a:rPr lang="en-US" dirty="0" smtClean="0"/>
+              <a:t>Sample Bot</a:t>
+            </a:r>
+            <a:br>
+              <a:rPr lang="en-US" dirty="0" smtClean="0"/>
+            </a:br>
+            <a:r>
+              <a:rPr lang="en-US" dirty="0" err="1" smtClean="0"/>
+              <a:t>Hotelbot</a:t>
+            </a:r>
+            <a:r>
+              <a:rPr lang="en-US" dirty="0" smtClean="0"/>
+              <a:t/>
+            </a:r>
+            <a:br>
+              <a:rPr lang="en-US" dirty="0" smtClean="0"/>
+            </a:br>
+            <a:r>
+              <a:rPr lang="en-US" dirty="0" smtClean="0"/>
+              <a:t>Example of Creating Models from data file</a:t>
+            </a:r>
+            <a:br>
+              <a:rPr lang="en-US" dirty="0" smtClean="0"/>
+            </a:br>
+            <a:r>
+              <a:rPr lang="en-US" dirty="0" smtClean="0"/>
+              <a:t>for Customer Support</a:t>
+            </a:r>
+            <a:endParaRPr lang="en-US" dirty="0"/>
+          </a:p>
+        </p:txBody>
+      </p:sp>
+    </p:spTree>
+    <p:extLst>
+      <p:ext uri="{BB962C8B-B14F-4D97-AF65-F5344CB8AC3E}">
+        <p14:creationId xmlns:p14="http://schemas.microsoft.com/office/powerpoint/2010/main" val="4291100550"/>
       </p:ext>
     </p:extLst>
   </p:cSld>

</xml_diff>

<commit_message>
New canonbot and byopizza dir custsupportbot, foodbot_nm, predictibot
</commit_message>
<xml_diff>
--- a/Predictika Training.pptx
+++ b/Predictika Training.pptx
@@ -5,7 +5,7 @@
     <p:sldMasterId id="2147483648" r:id="rId1"/>
   </p:sldMasterIdLst>
   <p:notesMasterIdLst>
-    <p:notesMasterId r:id="rId23"/>
+    <p:notesMasterId r:id="rId24"/>
   </p:notesMasterIdLst>
   <p:sldIdLst>
     <p:sldId id="1431" r:id="rId2"/>
@@ -23,12 +23,13 @@
     <p:sldId id="2501" r:id="rId14"/>
     <p:sldId id="2484" r:id="rId15"/>
     <p:sldId id="2489" r:id="rId16"/>
-    <p:sldId id="2500" r:id="rId17"/>
+    <p:sldId id="2503" r:id="rId17"/>
     <p:sldId id="2494" r:id="rId18"/>
     <p:sldId id="2495" r:id="rId19"/>
     <p:sldId id="2496" r:id="rId20"/>
     <p:sldId id="2492" r:id="rId21"/>
-    <p:sldId id="2498" r:id="rId22"/>
+    <p:sldId id="2500" r:id="rId22"/>
+    <p:sldId id="2498" r:id="rId23"/>
   </p:sldIdLst>
   <p:sldSz cx="12192000" cy="6858000"/>
   <p:notesSz cx="6858000" cy="9144000"/>
@@ -129,10 +130,10 @@
   </p:defaultTextStyle>
   <p:extLst>
     <p:ext uri="{EFAFB233-063F-42B5-8137-9DF3F51BA10A}">
-      <p15:sldGuideLst xmlns="" xmlns:p15="http://schemas.microsoft.com/office/powerpoint/2012/main"/>
+      <p15:sldGuideLst xmlns:p15="http://schemas.microsoft.com/office/powerpoint/2012/main" xmlns=""/>
     </p:ext>
     <p:ext uri="{2D200454-40CA-4A62-9FC3-DE9A4176ACB9}">
-      <p15:notesGuideLst xmlns="" xmlns:p15="http://schemas.microsoft.com/office/powerpoint/2012/main"/>
+      <p15:notesGuideLst xmlns:p15="http://schemas.microsoft.com/office/powerpoint/2012/main" xmlns=""/>
     </p:ext>
   </p:extLst>
 </p:presentation>
@@ -1402,31 +1403,31 @@
     </dgm:pt>
   </dgm:ptLst>
   <dgm:cxnLst>
+    <dgm:cxn modelId="{4B30396B-41F0-C744-AAF0-511CE61A2B5F}" type="presOf" srcId="{D7F934C2-AF37-6149-978C-0EB1F23AA12A}" destId="{D10A1F11-E3A4-D74D-9483-F93C714FDC20}" srcOrd="0" destOrd="0" presId="urn:microsoft.com/office/officeart/2005/8/layout/cycle2"/>
+    <dgm:cxn modelId="{1625A518-777B-DF4B-ABAE-D1E65D8C2A89}" type="presOf" srcId="{CE4624F8-EDCE-F141-9428-3A49CA91213B}" destId="{2FBC594B-5E77-2043-AA0E-EBAA350320B8}" srcOrd="0" destOrd="0" presId="urn:microsoft.com/office/officeart/2005/8/layout/cycle2"/>
+    <dgm:cxn modelId="{F661FA6E-FB5B-A244-83CD-7903C1CA30AA}" type="presOf" srcId="{82B2B41E-1228-FB4C-8E31-21B2DC4BBBF3}" destId="{7A2C39B8-BB7A-9244-9C64-50BAA03BA604}" srcOrd="1" destOrd="0" presId="urn:microsoft.com/office/officeart/2005/8/layout/cycle2"/>
+    <dgm:cxn modelId="{3B3B4E19-FDCD-0548-87C9-243579CFB4A3}" type="presOf" srcId="{DE453069-C71F-0D49-9DAF-4F6D0F299068}" destId="{7E1AB4D2-C0AE-1C4E-BA12-18EDF49AB549}" srcOrd="1" destOrd="0" presId="urn:microsoft.com/office/officeart/2005/8/layout/cycle2"/>
+    <dgm:cxn modelId="{BBC3032E-DAF8-D443-9370-A6631A155976}" type="presOf" srcId="{6AB534FF-6581-8243-A8CD-91760F5F8AA4}" destId="{300005B1-68A7-BC49-9E35-A37354642B92}" srcOrd="0" destOrd="0" presId="urn:microsoft.com/office/officeart/2005/8/layout/cycle2"/>
+    <dgm:cxn modelId="{406541BF-BD6B-8446-99E8-58185A438406}" srcId="{C25C7525-4287-EE4B-9DBC-8F615A37CB6A}" destId="{FACB940A-691A-E84E-AE20-F5B005285DC7}" srcOrd="3" destOrd="0" parTransId="{972D45D0-FFCF-814E-8D9C-B3A94120AF89}" sibTransId="{953A698A-2ADB-9B41-8333-B0F780126BD0}"/>
+    <dgm:cxn modelId="{C77642C1-7051-C84E-8948-D98F6C66CA6D}" type="presOf" srcId="{58A1DE89-E9E0-9449-81A8-56D8F6B063F5}" destId="{B2C10889-9E15-0F43-AA06-2114BB1162B4}" srcOrd="0" destOrd="0" presId="urn:microsoft.com/office/officeart/2005/8/layout/cycle2"/>
+    <dgm:cxn modelId="{E3681338-EB02-3C40-AB5E-11BB0BE22D16}" srcId="{C25C7525-4287-EE4B-9DBC-8F615A37CB6A}" destId="{306E06FE-2ED6-7D4B-83D7-16CD2C227D9A}" srcOrd="0" destOrd="0" parTransId="{55C830F7-6E9E-A241-BC4D-F4697E405D0E}" sibTransId="{BF6DD634-DEB5-E149-A521-A8F2E28A69DC}"/>
+    <dgm:cxn modelId="{DA83AEC4-4BD5-D14A-A19D-BE4CB4C7ECB9}" type="presOf" srcId="{C25C7525-4287-EE4B-9DBC-8F615A37CB6A}" destId="{F80827D1-6D4B-4345-A81E-F2269F6010F0}" srcOrd="0" destOrd="0" presId="urn:microsoft.com/office/officeart/2005/8/layout/cycle2"/>
+    <dgm:cxn modelId="{109E9522-AA33-2D46-B4D1-A66D9D5D26DA}" type="presOf" srcId="{FACB940A-691A-E84E-AE20-F5B005285DC7}" destId="{4998CBF0-CF06-1740-AF78-09C324656BB4}" srcOrd="0" destOrd="0" presId="urn:microsoft.com/office/officeart/2005/8/layout/cycle2"/>
+    <dgm:cxn modelId="{3E5908E1-19BB-2748-AF05-CA6E4882E15F}" srcId="{C25C7525-4287-EE4B-9DBC-8F615A37CB6A}" destId="{6AB534FF-6581-8243-A8CD-91760F5F8AA4}" srcOrd="1" destOrd="0" parTransId="{22344DCD-E298-1F47-9305-32796850A3D2}" sibTransId="{DE453069-C71F-0D49-9DAF-4F6D0F299068}"/>
+    <dgm:cxn modelId="{8A15503B-03DB-684B-921B-3A9B0C234058}" srcId="{C25C7525-4287-EE4B-9DBC-8F615A37CB6A}" destId="{CE4624F8-EDCE-F141-9428-3A49CA91213B}" srcOrd="2" destOrd="0" parTransId="{D9F5F3ED-D0C4-CF4D-B782-3AD993D669D7}" sibTransId="{6BB397D7-BE6E-514F-A3DC-C652CA83EBF9}"/>
+    <dgm:cxn modelId="{51F49B81-6CA1-6E40-97B8-0C7F7F3D80DB}" type="presOf" srcId="{82B2B41E-1228-FB4C-8E31-21B2DC4BBBF3}" destId="{B66D3D8C-AA54-0544-80B2-908E3BA2F676}" srcOrd="0" destOrd="0" presId="urn:microsoft.com/office/officeart/2005/8/layout/cycle2"/>
+    <dgm:cxn modelId="{0FAE7ADA-9532-E247-BCDE-46988635FB03}" srcId="{C25C7525-4287-EE4B-9DBC-8F615A37CB6A}" destId="{D7F934C2-AF37-6149-978C-0EB1F23AA12A}" srcOrd="5" destOrd="0" parTransId="{C60D4CBB-F593-CD41-870C-E6BFD3012323}" sibTransId="{766F9393-5F43-5146-AB19-BC6A8472E513}"/>
+    <dgm:cxn modelId="{D79940A7-0EF8-9B48-B7C4-C6EA85225D4E}" type="presOf" srcId="{6BB397D7-BE6E-514F-A3DC-C652CA83EBF9}" destId="{0394B159-A3D8-E34D-BA10-BA275F682E31}" srcOrd="1" destOrd="0" presId="urn:microsoft.com/office/officeart/2005/8/layout/cycle2"/>
+    <dgm:cxn modelId="{93217710-1F7E-CF47-A349-E0DD42B5EC37}" type="presOf" srcId="{306E06FE-2ED6-7D4B-83D7-16CD2C227D9A}" destId="{2CAE5448-9021-0240-8BB4-5D372F5FD5AA}" srcOrd="0" destOrd="0" presId="urn:microsoft.com/office/officeart/2005/8/layout/cycle2"/>
+    <dgm:cxn modelId="{E776F748-ADE9-2E46-A262-FE4574282116}" type="presOf" srcId="{953A698A-2ADB-9B41-8333-B0F780126BD0}" destId="{23EF3085-DDB4-4740-912E-6383BC7C0AA7}" srcOrd="1" destOrd="0" presId="urn:microsoft.com/office/officeart/2005/8/layout/cycle2"/>
     <dgm:cxn modelId="{AC893EB2-5F07-C04B-AEDD-6136A1BFFCC8}" type="presOf" srcId="{766F9393-5F43-5146-AB19-BC6A8472E513}" destId="{1F024B8E-29A6-0349-830D-7EB8C95C2BCF}" srcOrd="0" destOrd="0" presId="urn:microsoft.com/office/officeart/2005/8/layout/cycle2"/>
-    <dgm:cxn modelId="{DA83AEC4-4BD5-D14A-A19D-BE4CB4C7ECB9}" type="presOf" srcId="{C25C7525-4287-EE4B-9DBC-8F615A37CB6A}" destId="{F80827D1-6D4B-4345-A81E-F2269F6010F0}" srcOrd="0" destOrd="0" presId="urn:microsoft.com/office/officeart/2005/8/layout/cycle2"/>
+    <dgm:cxn modelId="{D7FCE24D-8756-BA4B-B626-590990C24F91}" type="presOf" srcId="{953A698A-2ADB-9B41-8333-B0F780126BD0}" destId="{09DFF67C-F127-F249-8260-11B586AF1069}" srcOrd="0" destOrd="0" presId="urn:microsoft.com/office/officeart/2005/8/layout/cycle2"/>
+    <dgm:cxn modelId="{DE4CC122-02AE-904D-A2E3-3FCFF5E46629}" type="presOf" srcId="{DE453069-C71F-0D49-9DAF-4F6D0F299068}" destId="{A85474C1-CDD2-9D43-841D-57B6295467B7}" srcOrd="0" destOrd="0" presId="urn:microsoft.com/office/officeart/2005/8/layout/cycle2"/>
     <dgm:cxn modelId="{BE9E44A8-D20E-B14E-9F6B-C8BE48E7C8E1}" type="presOf" srcId="{BF6DD634-DEB5-E149-A521-A8F2E28A69DC}" destId="{8833AF80-6D52-CA41-81B5-E2830F43C3D0}" srcOrd="1" destOrd="0" presId="urn:microsoft.com/office/officeart/2005/8/layout/cycle2"/>
-    <dgm:cxn modelId="{D79940A7-0EF8-9B48-B7C4-C6EA85225D4E}" type="presOf" srcId="{6BB397D7-BE6E-514F-A3DC-C652CA83EBF9}" destId="{0394B159-A3D8-E34D-BA10-BA275F682E31}" srcOrd="1" destOrd="0" presId="urn:microsoft.com/office/officeart/2005/8/layout/cycle2"/>
     <dgm:cxn modelId="{005713D4-A294-314D-8F7C-F0441F8299B9}" type="presOf" srcId="{BF6DD634-DEB5-E149-A521-A8F2E28A69DC}" destId="{6DD1B05A-3570-4A4A-A01E-F76B969F601B}" srcOrd="0" destOrd="0" presId="urn:microsoft.com/office/officeart/2005/8/layout/cycle2"/>
-    <dgm:cxn modelId="{F661FA6E-FB5B-A244-83CD-7903C1CA30AA}" type="presOf" srcId="{82B2B41E-1228-FB4C-8E31-21B2DC4BBBF3}" destId="{7A2C39B8-BB7A-9244-9C64-50BAA03BA604}" srcOrd="1" destOrd="0" presId="urn:microsoft.com/office/officeart/2005/8/layout/cycle2"/>
-    <dgm:cxn modelId="{E776F748-ADE9-2E46-A262-FE4574282116}" type="presOf" srcId="{953A698A-2ADB-9B41-8333-B0F780126BD0}" destId="{23EF3085-DDB4-4740-912E-6383BC7C0AA7}" srcOrd="1" destOrd="0" presId="urn:microsoft.com/office/officeart/2005/8/layout/cycle2"/>
-    <dgm:cxn modelId="{1625A518-777B-DF4B-ABAE-D1E65D8C2A89}" type="presOf" srcId="{CE4624F8-EDCE-F141-9428-3A49CA91213B}" destId="{2FBC594B-5E77-2043-AA0E-EBAA350320B8}" srcOrd="0" destOrd="0" presId="urn:microsoft.com/office/officeart/2005/8/layout/cycle2"/>
-    <dgm:cxn modelId="{BBC3032E-DAF8-D443-9370-A6631A155976}" type="presOf" srcId="{6AB534FF-6581-8243-A8CD-91760F5F8AA4}" destId="{300005B1-68A7-BC49-9E35-A37354642B92}" srcOrd="0" destOrd="0" presId="urn:microsoft.com/office/officeart/2005/8/layout/cycle2"/>
-    <dgm:cxn modelId="{4B30396B-41F0-C744-AAF0-511CE61A2B5F}" type="presOf" srcId="{D7F934C2-AF37-6149-978C-0EB1F23AA12A}" destId="{D10A1F11-E3A4-D74D-9483-F93C714FDC20}" srcOrd="0" destOrd="0" presId="urn:microsoft.com/office/officeart/2005/8/layout/cycle2"/>
-    <dgm:cxn modelId="{C77642C1-7051-C84E-8948-D98F6C66CA6D}" type="presOf" srcId="{58A1DE89-E9E0-9449-81A8-56D8F6B063F5}" destId="{B2C10889-9E15-0F43-AA06-2114BB1162B4}" srcOrd="0" destOrd="0" presId="urn:microsoft.com/office/officeart/2005/8/layout/cycle2"/>
-    <dgm:cxn modelId="{51F49B81-6CA1-6E40-97B8-0C7F7F3D80DB}" type="presOf" srcId="{82B2B41E-1228-FB4C-8E31-21B2DC4BBBF3}" destId="{B66D3D8C-AA54-0544-80B2-908E3BA2F676}" srcOrd="0" destOrd="0" presId="urn:microsoft.com/office/officeart/2005/8/layout/cycle2"/>
-    <dgm:cxn modelId="{3B3B4E19-FDCD-0548-87C9-243579CFB4A3}" type="presOf" srcId="{DE453069-C71F-0D49-9DAF-4F6D0F299068}" destId="{7E1AB4D2-C0AE-1C4E-BA12-18EDF49AB549}" srcOrd="1" destOrd="0" presId="urn:microsoft.com/office/officeart/2005/8/layout/cycle2"/>
-    <dgm:cxn modelId="{93217710-1F7E-CF47-A349-E0DD42B5EC37}" type="presOf" srcId="{306E06FE-2ED6-7D4B-83D7-16CD2C227D9A}" destId="{2CAE5448-9021-0240-8BB4-5D372F5FD5AA}" srcOrd="0" destOrd="0" presId="urn:microsoft.com/office/officeart/2005/8/layout/cycle2"/>
-    <dgm:cxn modelId="{109E9522-AA33-2D46-B4D1-A66D9D5D26DA}" type="presOf" srcId="{FACB940A-691A-E84E-AE20-F5B005285DC7}" destId="{4998CBF0-CF06-1740-AF78-09C324656BB4}" srcOrd="0" destOrd="0" presId="urn:microsoft.com/office/officeart/2005/8/layout/cycle2"/>
-    <dgm:cxn modelId="{DE4CC122-02AE-904D-A2E3-3FCFF5E46629}" type="presOf" srcId="{DE453069-C71F-0D49-9DAF-4F6D0F299068}" destId="{A85474C1-CDD2-9D43-841D-57B6295467B7}" srcOrd="0" destOrd="0" presId="urn:microsoft.com/office/officeart/2005/8/layout/cycle2"/>
-    <dgm:cxn modelId="{3E5908E1-19BB-2748-AF05-CA6E4882E15F}" srcId="{C25C7525-4287-EE4B-9DBC-8F615A37CB6A}" destId="{6AB534FF-6581-8243-A8CD-91760F5F8AA4}" srcOrd="1" destOrd="0" parTransId="{22344DCD-E298-1F47-9305-32796850A3D2}" sibTransId="{DE453069-C71F-0D49-9DAF-4F6D0F299068}"/>
-    <dgm:cxn modelId="{BE533F60-2A5B-D943-9E48-29613C2B4227}" type="presOf" srcId="{6BB397D7-BE6E-514F-A3DC-C652CA83EBF9}" destId="{FE562CA8-E307-9D43-824D-719499E79FB0}" srcOrd="0" destOrd="0" presId="urn:microsoft.com/office/officeart/2005/8/layout/cycle2"/>
-    <dgm:cxn modelId="{D7FCE24D-8756-BA4B-B626-590990C24F91}" type="presOf" srcId="{953A698A-2ADB-9B41-8333-B0F780126BD0}" destId="{09DFF67C-F127-F249-8260-11B586AF1069}" srcOrd="0" destOrd="0" presId="urn:microsoft.com/office/officeart/2005/8/layout/cycle2"/>
     <dgm:cxn modelId="{40D2812F-6004-7A4A-8A48-694D5F66AC5B}" srcId="{C25C7525-4287-EE4B-9DBC-8F615A37CB6A}" destId="{58A1DE89-E9E0-9449-81A8-56D8F6B063F5}" srcOrd="4" destOrd="0" parTransId="{CCE072AF-C88B-784C-8FAD-B25CF9B5FF44}" sibTransId="{82B2B41E-1228-FB4C-8E31-21B2DC4BBBF3}"/>
     <dgm:cxn modelId="{210AF336-554C-F24C-A80E-D61F80429099}" type="presOf" srcId="{766F9393-5F43-5146-AB19-BC6A8472E513}" destId="{30EECE98-07E5-1A42-85FF-20FAA0D45A25}" srcOrd="1" destOrd="0" presId="urn:microsoft.com/office/officeart/2005/8/layout/cycle2"/>
-    <dgm:cxn modelId="{0FAE7ADA-9532-E247-BCDE-46988635FB03}" srcId="{C25C7525-4287-EE4B-9DBC-8F615A37CB6A}" destId="{D7F934C2-AF37-6149-978C-0EB1F23AA12A}" srcOrd="5" destOrd="0" parTransId="{C60D4CBB-F593-CD41-870C-E6BFD3012323}" sibTransId="{766F9393-5F43-5146-AB19-BC6A8472E513}"/>
-    <dgm:cxn modelId="{E3681338-EB02-3C40-AB5E-11BB0BE22D16}" srcId="{C25C7525-4287-EE4B-9DBC-8F615A37CB6A}" destId="{306E06FE-2ED6-7D4B-83D7-16CD2C227D9A}" srcOrd="0" destOrd="0" parTransId="{55C830F7-6E9E-A241-BC4D-F4697E405D0E}" sibTransId="{BF6DD634-DEB5-E149-A521-A8F2E28A69DC}"/>
-    <dgm:cxn modelId="{406541BF-BD6B-8446-99E8-58185A438406}" srcId="{C25C7525-4287-EE4B-9DBC-8F615A37CB6A}" destId="{FACB940A-691A-E84E-AE20-F5B005285DC7}" srcOrd="3" destOrd="0" parTransId="{972D45D0-FFCF-814E-8D9C-B3A94120AF89}" sibTransId="{953A698A-2ADB-9B41-8333-B0F780126BD0}"/>
-    <dgm:cxn modelId="{8A15503B-03DB-684B-921B-3A9B0C234058}" srcId="{C25C7525-4287-EE4B-9DBC-8F615A37CB6A}" destId="{CE4624F8-EDCE-F141-9428-3A49CA91213B}" srcOrd="2" destOrd="0" parTransId="{D9F5F3ED-D0C4-CF4D-B782-3AD993D669D7}" sibTransId="{6BB397D7-BE6E-514F-A3DC-C652CA83EBF9}"/>
+    <dgm:cxn modelId="{BE533F60-2A5B-D943-9E48-29613C2B4227}" type="presOf" srcId="{6BB397D7-BE6E-514F-A3DC-C652CA83EBF9}" destId="{FE562CA8-E307-9D43-824D-719499E79FB0}" srcOrd="0" destOrd="0" presId="urn:microsoft.com/office/officeart/2005/8/layout/cycle2"/>
     <dgm:cxn modelId="{C92924B2-5F05-E843-8450-0A54115375D5}" type="presParOf" srcId="{F80827D1-6D4B-4345-A81E-F2269F6010F0}" destId="{2CAE5448-9021-0240-8BB4-5D372F5FD5AA}" srcOrd="0" destOrd="0" presId="urn:microsoft.com/office/officeart/2005/8/layout/cycle2"/>
     <dgm:cxn modelId="{F5BC51FB-9A76-1049-B0A4-42DC97E6CB46}" type="presParOf" srcId="{F80827D1-6D4B-4345-A81E-F2269F6010F0}" destId="{6DD1B05A-3570-4A4A-A01E-F76B969F601B}" srcOrd="1" destOrd="0" presId="urn:microsoft.com/office/officeart/2005/8/layout/cycle2"/>
     <dgm:cxn modelId="{3A3A231F-8463-164B-B4D6-F27E1E7FB86C}" type="presParOf" srcId="{6DD1B05A-3570-4A4A-A01E-F76B969F601B}" destId="{8833AF80-6D52-CA41-81B5-E2830F43C3D0}" srcOrd="0" destOrd="0" presId="urn:microsoft.com/office/officeart/2005/8/layout/cycle2"/>
@@ -3977,7 +3978,7 @@
           <a:p>
             <a:fld id="{C0B1B5E3-F2FF-4447-9F2E-6FC79E5AC69B}" type="datetimeFigureOut">
               <a:rPr lang="en-MY" smtClean="0"/>
-              <a:t>1/4/20</a:t>
+              <a:t>1/15/20</a:t>
             </a:fld>
             <a:endParaRPr lang="en-MY"/>
           </a:p>
@@ -5310,7 +5311,7 @@
           <a:p>
             <a:fld id="{161A4FCD-E86F-A94E-AB1F-60D81A1F64AD}" type="datetimeFigureOut">
               <a:rPr lang="en-US" smtClean="0"/>
-              <a:t>1/4/20</a:t>
+              <a:t>1/15/20</a:t>
             </a:fld>
             <a:endParaRPr lang="en-US"/>
           </a:p>
@@ -8341,13 +8342,21 @@
           <a:p>
             <a:r>
               <a:rPr lang="en-US" dirty="0" smtClean="0"/>
-              <a:t>Table</a:t>
+              <a:t>Combination Table and Exclusion Table constraints</a:t>
             </a:r>
           </a:p>
           <a:p>
             <a:r>
               <a:rPr lang="en-US" dirty="0" smtClean="0"/>
-              <a:t>Rule-like constraints that can be very different from traditional rules</a:t>
+              <a:t>Rule-like constraints that are </a:t>
+            </a:r>
+            <a:r>
+              <a:rPr lang="en-US" u="sng" dirty="0" smtClean="0"/>
+              <a:t>very</a:t>
+            </a:r>
+            <a:r>
+              <a:rPr lang="en-US" dirty="0" smtClean="0"/>
+              <a:t> different from traditional rules</a:t>
             </a:r>
           </a:p>
           <a:p>
@@ -8587,35 +8596,37 @@
         </p:nvSpPr>
         <p:spPr>
           <a:xfrm>
-            <a:off x="1459856" y="1321251"/>
-            <a:ext cx="9144000" cy="3907622"/>
+            <a:off x="1524000" y="1635001"/>
+            <a:ext cx="9144000" cy="3607895"/>
           </a:xfrm>
         </p:spPr>
         <p:txBody>
-          <a:bodyPr/>
+          <a:bodyPr>
+            <a:normAutofit/>
+          </a:bodyPr>
           <a:lstStyle/>
           <a:p>
             <a:r>
+              <a:rPr lang="en-US" dirty="0" err="1" smtClean="0"/>
+              <a:t>Foodbot</a:t>
+            </a:r>
+            <a:r>
               <a:rPr lang="en-US" dirty="0" smtClean="0"/>
-              <a:t>Sample Bot</a:t>
+              <a:t/>
             </a:r>
             <a:br>
               <a:rPr lang="en-US" dirty="0" smtClean="0"/>
             </a:br>
             <a:r>
-              <a:rPr lang="en-US" dirty="0" err="1" smtClean="0"/>
-              <a:t>Predictibot</a:t>
-            </a:r>
-            <a:r>
               <a:rPr lang="en-US" dirty="0" smtClean="0"/>
-              <a:t/>
+              <a:t>based on complete </a:t>
             </a:r>
             <a:br>
               <a:rPr lang="en-US" dirty="0" smtClean="0"/>
             </a:br>
             <a:r>
               <a:rPr lang="en-US" dirty="0" smtClean="0"/>
-              <a:t>Example of Website Agent</a:t>
+              <a:t>Pizza Hut menu</a:t>
             </a:r>
             <a:endParaRPr lang="en-US" dirty="0"/>
           </a:p>
@@ -8624,7 +8635,7 @@
     </p:spTree>
     <p:extLst>
       <p:ext uri="{BB962C8B-B14F-4D97-AF65-F5344CB8AC3E}">
-        <p14:creationId xmlns:p14="http://schemas.microsoft.com/office/powerpoint/2010/main" val="2298216452"/>
+        <p14:creationId xmlns:p14="http://schemas.microsoft.com/office/powerpoint/2010/main" val="1736690718"/>
       </p:ext>
     </p:extLst>
   </p:cSld>
@@ -9902,6 +9913,85 @@
 </file>
 
 <file path=ppt/slides/slide21.xml><?xml version="1.0" encoding="utf-8"?>
+<p:sld xmlns:a="http://schemas.openxmlformats.org/drawingml/2006/main" xmlns:r="http://schemas.openxmlformats.org/officeDocument/2006/relationships" xmlns:p="http://schemas.openxmlformats.org/presentationml/2006/main">
+  <p:cSld>
+    <p:spTree>
+      <p:nvGrpSpPr>
+        <p:cNvPr id="1" name=""/>
+        <p:cNvGrpSpPr/>
+        <p:nvPr/>
+      </p:nvGrpSpPr>
+      <p:grpSpPr>
+        <a:xfrm>
+          <a:off x="0" y="0"/>
+          <a:ext cx="0" cy="0"/>
+          <a:chOff x="0" y="0"/>
+          <a:chExt cx="0" cy="0"/>
+        </a:xfrm>
+      </p:grpSpPr>
+      <p:sp>
+        <p:nvSpPr>
+          <p:cNvPr id="2" name="Title 1"/>
+          <p:cNvSpPr>
+            <a:spLocks noGrp="1"/>
+          </p:cNvSpPr>
+          <p:nvPr>
+            <p:ph type="ctrTitle"/>
+          </p:nvPr>
+        </p:nvSpPr>
+        <p:spPr>
+          <a:xfrm>
+            <a:off x="1459856" y="1321251"/>
+            <a:ext cx="9144000" cy="3907622"/>
+          </a:xfrm>
+        </p:spPr>
+        <p:txBody>
+          <a:bodyPr/>
+          <a:lstStyle/>
+          <a:p>
+            <a:r>
+              <a:rPr lang="en-US" dirty="0" smtClean="0"/>
+              <a:t>Sample Bot</a:t>
+            </a:r>
+            <a:br>
+              <a:rPr lang="en-US" dirty="0" smtClean="0"/>
+            </a:br>
+            <a:r>
+              <a:rPr lang="en-US" dirty="0" err="1" smtClean="0"/>
+              <a:t>Predictibot</a:t>
+            </a:r>
+            <a:r>
+              <a:rPr lang="en-US" dirty="0" smtClean="0"/>
+              <a:t/>
+            </a:r>
+            <a:br>
+              <a:rPr lang="en-US" dirty="0" smtClean="0"/>
+            </a:br>
+            <a:r>
+              <a:rPr lang="en-US" dirty="0" smtClean="0"/>
+              <a:t>Example of Website Agent</a:t>
+            </a:r>
+            <a:endParaRPr lang="en-US" dirty="0"/>
+          </a:p>
+        </p:txBody>
+      </p:sp>
+    </p:spTree>
+    <p:extLst>
+      <p:ext uri="{BB962C8B-B14F-4D97-AF65-F5344CB8AC3E}">
+        <p14:creationId xmlns:p14="http://schemas.microsoft.com/office/powerpoint/2010/main" val="2298216452"/>
+      </p:ext>
+    </p:extLst>
+  </p:cSld>
+  <p:clrMapOvr>
+    <a:masterClrMapping/>
+  </p:clrMapOvr>
+  <p:transition xmlns:p14="http://schemas.microsoft.com/office/powerpoint/2010/main" spd="slow">
+    <p:push dir="u"/>
+  </p:transition>
+</p:sld>
+</file>
+
+<file path=ppt/slides/slide22.xml><?xml version="1.0" encoding="utf-8"?>
 <p:sld xmlns:a="http://schemas.openxmlformats.org/drawingml/2006/main" xmlns:r="http://schemas.openxmlformats.org/officeDocument/2006/relationships" xmlns:p="http://schemas.openxmlformats.org/presentationml/2006/main">
   <p:cSld>
     <p:spTree>
@@ -12987,15 +13077,7 @@
           <a:p>
             <a:r>
               <a:rPr lang="en-US" dirty="0" smtClean="0"/>
-              <a:t>Building </a:t>
-            </a:r>
-            <a:r>
-              <a:rPr lang="en-US" dirty="0" smtClean="0"/>
-              <a:t>a Virtual </a:t>
-            </a:r>
-            <a:r>
-              <a:rPr lang="en-US" dirty="0" smtClean="0"/>
-              <a:t>Agent with Predictika</a:t>
+              <a:t>Building a Virtual Agent with Predictika</a:t>
             </a:r>
             <a:endParaRPr lang="en-US" dirty="0"/>
           </a:p>
@@ -13875,7 +13957,7 @@
   <a:extraClrSchemeLst/>
   <a:extLst>
     <a:ext uri="{05A4C25C-085E-4340-85A3-A5531E510DB2}">
-      <thm15:themeFamily xmlns="" xmlns:thm15="http://schemas.microsoft.com/office/thememl/2012/main" name="Office Theme" id="{62F939B6-93AF-4DB8-9C6B-D6C7DFDC589F}" vid="{4A3C46E8-61CC-4603-A589-7422A47A8E4A}"/>
+      <thm15:themeFamily xmlns:thm15="http://schemas.microsoft.com/office/thememl/2012/main" xmlns="" name="Office Theme" id="{62F939B6-93AF-4DB8-9C6B-D6C7DFDC589F}" vid="{4A3C46E8-61CC-4603-A589-7422A47A8E4A}"/>
     </a:ext>
   </a:extLst>
 </a:theme>
@@ -14136,7 +14218,7 @@
   <a:extraClrSchemeLst/>
   <a:extLst>
     <a:ext uri="{05A4C25C-085E-4340-85A3-A5531E510DB2}">
-      <thm15:themeFamily xmlns="" xmlns:thm15="http://schemas.microsoft.com/office/thememl/2012/main" name="Office Theme" id="{62F939B6-93AF-4DB8-9C6B-D6C7DFDC589F}" vid="{4A3C46E8-61CC-4603-A589-7422A47A8E4A}"/>
+      <thm15:themeFamily xmlns:thm15="http://schemas.microsoft.com/office/thememl/2012/main" xmlns="" name="Office Theme" id="{62F939B6-93AF-4DB8-9C6B-D6C7DFDC589F}" vid="{4A3C46E8-61CC-4603-A589-7422A47A8E4A}"/>
     </a:ext>
   </a:extLst>
 </a:theme>

</xml_diff>